<commit_message>
update weeks 2 & 3
</commit_message>
<xml_diff>
--- a/google-drive/week03/5Fri/2_LAsBEST TEMPLATE.pptx
+++ b/google-drive/week03/5Fri/2_LAsBEST TEMPLATE.pptx
@@ -5576,7 +5576,7 @@
           <p:nvPr/>
         </p:nvPicPr>
         <p:blipFill>
-          <a:blip r:embed="rId4"/>
+          <a:blip r:embed="rId3"/>
           <a:srcRect/>
           <a:stretch>
             <a:fillRect/>
@@ -5615,12 +5615,12 @@
           <a:graphicData uri="http://schemas.openxmlformats.org/presentationml/2006/ole">
             <mc:AlternateContent xmlns:mc="http://schemas.openxmlformats.org/markup-compatibility/2006">
               <mc:Choice xmlns:v="urn:schemas-microsoft-com:vml" Requires="v">
-                <p:oleObj spid="_x0000_s18666" name="Equation" r:id="rId5" imgW="100440" imgH="155160" progId="Equation.3">
+                <p:oleObj name="Equation" r:id="rId4" imgW="100440" imgH="155160" progId="Equation.3">
                   <p:embed/>
                 </p:oleObj>
               </mc:Choice>
               <mc:Fallback>
-                <p:oleObj name="Equation" r:id="rId5" imgW="100440" imgH="155160" progId="Equation.3">
+                <p:oleObj name="Equation" r:id="rId4" imgW="100440" imgH="155160" progId="Equation.3">
                   <p:embed/>
                   <p:pic>
                     <p:nvPicPr>
@@ -5631,7 +5631,7 @@
                       <p:nvPr/>
                     </p:nvPicPr>
                     <p:blipFill>
-                      <a:blip r:embed="rId6">
+                      <a:blip r:embed="rId5">
                         <a:extLst>
                           <a:ext uri="{28A0092B-C50C-407E-A947-70E740481C1C}">
                             <a14:useLocalDpi xmlns:a14="http://schemas.microsoft.com/office/drawing/2010/main" val="0"/>
@@ -5654,7 +5654,7 @@
                       <a:noFill/>
                       <a:extLst>
                         <a:ext uri="{909E8E84-426E-40dd-AFC4-6F175D3DCCD1}">
-                          <a14:hiddenFill xmlns:a14="http://schemas.microsoft.com/office/drawing/2010/main" xmlns="">
+                          <a14:hiddenFill xmlns="" xmlns:a14="http://schemas.microsoft.com/office/drawing/2010/main">
                             <a:solidFill>
                               <a:srgbClr val="FFFFFF"/>
                             </a:solidFill>
@@ -5695,44 +5695,6 @@
           </a:p>
         </p:txBody>
       </p:sp>
-      <p:pic>
-        <p:nvPicPr>
-          <p:cNvPr id="16" name="Google Shape;126;p1">
-            <a:extLst>
-              <a:ext uri="{FF2B5EF4-FFF2-40B4-BE49-F238E27FC236}">
-                <a16:creationId xmlns:a16="http://schemas.microsoft.com/office/drawing/2014/main" id="{E5EBFAB2-D5FA-B748-AE4F-51387666F00D}"/>
-              </a:ext>
-            </a:extLst>
-          </p:cNvPr>
-          <p:cNvPicPr preferRelativeResize="0"/>
-          <p:nvPr/>
-        </p:nvPicPr>
-        <p:blipFill rotWithShape="1">
-          <a:blip r:embed="rId7">
-            <a:alphaModFix/>
-          </a:blip>
-          <a:srcRect/>
-          <a:stretch/>
-        </p:blipFill>
-        <p:spPr>
-          <a:xfrm>
-            <a:off x="37354156" y="499858"/>
-            <a:ext cx="4251264" cy="4072470"/>
-          </a:xfrm>
-          <a:prstGeom prst="rect">
-            <a:avLst/>
-          </a:prstGeom>
-          <a:solidFill>
-            <a:schemeClr val="accent4">
-              <a:lumMod val="60000"/>
-              <a:lumOff val="40000"/>
-            </a:schemeClr>
-          </a:solidFill>
-          <a:ln>
-            <a:noFill/>
-          </a:ln>
-        </p:spPr>
-      </p:pic>
       <p:sp>
         <p:nvSpPr>
           <p:cNvPr id="2" name="Rectangle 1"/>
@@ -7043,6 +7005,36 @@
           </a:p>
         </p:txBody>
       </p:sp>
+      <p:pic>
+        <p:nvPicPr>
+          <p:cNvPr id="4" name="Picture 3" descr="A close-up of a logo&#10;&#10;Description automatically generated with medium confidence">
+            <a:extLst>
+              <a:ext uri="{FF2B5EF4-FFF2-40B4-BE49-F238E27FC236}">
+                <a16:creationId xmlns:a16="http://schemas.microsoft.com/office/drawing/2014/main" id="{E8D27D15-F7F2-E717-6AB4-B2B031EEDA13}"/>
+              </a:ext>
+            </a:extLst>
+          </p:cNvPr>
+          <p:cNvPicPr>
+            <a:picLocks noChangeAspect="1"/>
+          </p:cNvPicPr>
+          <p:nvPr/>
+        </p:nvPicPr>
+        <p:blipFill>
+          <a:blip r:embed="rId6"/>
+          <a:stretch>
+            <a:fillRect/>
+          </a:stretch>
+        </p:blipFill>
+        <p:spPr>
+          <a:xfrm>
+            <a:off x="36768505" y="-63309"/>
+            <a:ext cx="5293895" cy="5293895"/>
+          </a:xfrm>
+          <a:prstGeom prst="rect">
+            <a:avLst/>
+          </a:prstGeom>
+        </p:spPr>
+      </p:pic>
     </p:spTree>
   </p:cSld>
   <p:clrMapOvr>

</xml_diff>